<commit_message>
revision9, eliminated inconsistencies in main paper and extended discussion about selection of parameters in supplementary material
</commit_message>
<xml_diff>
--- a/suppl_images/ando-fit-ext.pptx
+++ b/suppl_images/ando-fit-ext.pptx
@@ -288,7 +288,7 @@
           <a:p>
             <a:fld id="{2223F258-95BC-48A2-8A68-392A1D604CC1}" type="datetimeFigureOut">
               <a:rPr lang="en-US" smtClean="0"/>
-              <a:t>7/18/2013</a:t>
+              <a:t>7/19/2013</a:t>
             </a:fld>
             <a:endParaRPr lang="en-US"/>
           </a:p>
@@ -458,7 +458,7 @@
           <a:p>
             <a:fld id="{2223F258-95BC-48A2-8A68-392A1D604CC1}" type="datetimeFigureOut">
               <a:rPr lang="en-US" smtClean="0"/>
-              <a:t>7/18/2013</a:t>
+              <a:t>7/19/2013</a:t>
             </a:fld>
             <a:endParaRPr lang="en-US"/>
           </a:p>
@@ -638,7 +638,7 @@
           <a:p>
             <a:fld id="{2223F258-95BC-48A2-8A68-392A1D604CC1}" type="datetimeFigureOut">
               <a:rPr lang="en-US" smtClean="0"/>
-              <a:t>7/18/2013</a:t>
+              <a:t>7/19/2013</a:t>
             </a:fld>
             <a:endParaRPr lang="en-US"/>
           </a:p>
@@ -808,7 +808,7 @@
           <a:p>
             <a:fld id="{2223F258-95BC-48A2-8A68-392A1D604CC1}" type="datetimeFigureOut">
               <a:rPr lang="en-US" smtClean="0"/>
-              <a:t>7/18/2013</a:t>
+              <a:t>7/19/2013</a:t>
             </a:fld>
             <a:endParaRPr lang="en-US"/>
           </a:p>
@@ -1054,7 +1054,7 @@
           <a:p>
             <a:fld id="{2223F258-95BC-48A2-8A68-392A1D604CC1}" type="datetimeFigureOut">
               <a:rPr lang="en-US" smtClean="0"/>
-              <a:t>7/18/2013</a:t>
+              <a:t>7/19/2013</a:t>
             </a:fld>
             <a:endParaRPr lang="en-US"/>
           </a:p>
@@ -1342,7 +1342,7 @@
           <a:p>
             <a:fld id="{2223F258-95BC-48A2-8A68-392A1D604CC1}" type="datetimeFigureOut">
               <a:rPr lang="en-US" smtClean="0"/>
-              <a:t>7/18/2013</a:t>
+              <a:t>7/19/2013</a:t>
             </a:fld>
             <a:endParaRPr lang="en-US"/>
           </a:p>
@@ -1764,7 +1764,7 @@
           <a:p>
             <a:fld id="{2223F258-95BC-48A2-8A68-392A1D604CC1}" type="datetimeFigureOut">
               <a:rPr lang="en-US" smtClean="0"/>
-              <a:t>7/18/2013</a:t>
+              <a:t>7/19/2013</a:t>
             </a:fld>
             <a:endParaRPr lang="en-US"/>
           </a:p>
@@ -1882,7 +1882,7 @@
           <a:p>
             <a:fld id="{2223F258-95BC-48A2-8A68-392A1D604CC1}" type="datetimeFigureOut">
               <a:rPr lang="en-US" smtClean="0"/>
-              <a:t>7/18/2013</a:t>
+              <a:t>7/19/2013</a:t>
             </a:fld>
             <a:endParaRPr lang="en-US"/>
           </a:p>
@@ -1977,7 +1977,7 @@
           <a:p>
             <a:fld id="{2223F258-95BC-48A2-8A68-392A1D604CC1}" type="datetimeFigureOut">
               <a:rPr lang="en-US" smtClean="0"/>
-              <a:t>7/18/2013</a:t>
+              <a:t>7/19/2013</a:t>
             </a:fld>
             <a:endParaRPr lang="en-US"/>
           </a:p>
@@ -2254,7 +2254,7 @@
           <a:p>
             <a:fld id="{2223F258-95BC-48A2-8A68-392A1D604CC1}" type="datetimeFigureOut">
               <a:rPr lang="en-US" smtClean="0"/>
-              <a:t>7/18/2013</a:t>
+              <a:t>7/19/2013</a:t>
             </a:fld>
             <a:endParaRPr lang="en-US"/>
           </a:p>
@@ -2507,7 +2507,7 @@
           <a:p>
             <a:fld id="{2223F258-95BC-48A2-8A68-392A1D604CC1}" type="datetimeFigureOut">
               <a:rPr lang="en-US" smtClean="0"/>
-              <a:t>7/18/2013</a:t>
+              <a:t>7/19/2013</a:t>
             </a:fld>
             <a:endParaRPr lang="en-US"/>
           </a:p>
@@ -2720,7 +2720,7 @@
           <a:p>
             <a:fld id="{2223F258-95BC-48A2-8A68-392A1D604CC1}" type="datetimeFigureOut">
               <a:rPr lang="en-US" smtClean="0"/>
-              <a:t>7/18/2013</a:t>
+              <a:t>7/19/2013</a:t>
             </a:fld>
             <a:endParaRPr lang="en-US"/>
           </a:p>
@@ -3097,6 +3097,95 @@
       </p:grpSpPr>
       <p:pic>
         <p:nvPicPr>
+          <p:cNvPr id="1026" name="Picture 2" descr="C:\Users\Owner\research\graphene\graphene_hf\results\2009_MagnetoPhonons_121\Ando-Model\l-42_d-10_dn-03_vf-118_w0-15820_d0-55_DLCombi-FWHM.png"/>
+          <p:cNvPicPr>
+            <a:picLocks noChangeAspect="1" noChangeArrowheads="1"/>
+          </p:cNvPicPr>
+          <p:nvPr/>
+        </p:nvPicPr>
+        <p:blipFill>
+          <a:blip r:embed="rId2" cstate="print">
+            <a:extLst>
+              <a:ext uri="{28A0092B-C50C-407E-A947-70E740481C1C}">
+                <a14:useLocalDpi xmlns:a14="http://schemas.microsoft.com/office/drawing/2010/main" val="0"/>
+              </a:ext>
+            </a:extLst>
+          </a:blip>
+          <a:srcRect/>
+          <a:stretch>
+            <a:fillRect/>
+          </a:stretch>
+        </p:blipFill>
+        <p:spPr bwMode="auto">
+          <a:xfrm>
+            <a:off x="4419600" y="3543300"/>
+            <a:ext cx="4572000" cy="3429000"/>
+          </a:xfrm>
+          <a:prstGeom prst="rect">
+            <a:avLst/>
+          </a:prstGeom>
+          <a:noFill/>
+          <a:extLst>
+            <a:ext uri="{909E8E84-426E-40DD-AFC4-6F175D3DCCD1}">
+              <a14:hiddenFill xmlns:a14="http://schemas.microsoft.com/office/drawing/2010/main">
+                <a:solidFill>
+                  <a:srgbClr val="FFFFFF"/>
+                </a:solidFill>
+              </a14:hiddenFill>
+            </a:ext>
+          </a:extLst>
+        </p:spPr>
+      </p:pic>
+      <p:pic>
+        <p:nvPicPr>
+          <p:cNvPr id="10" name="Picture 9" descr="C:\Users\Owner\research\graphene\graphene_hf\results\2009_MagnetoPhonons_121\FillingFactor-Dependence\GateVoltageTuning-POSITION-withSymmetricTransitions.png"/>
+          <p:cNvPicPr>
+            <a:picLocks noChangeAspect="1" noChangeArrowheads="1"/>
+          </p:cNvPicPr>
+          <p:nvPr/>
+        </p:nvPicPr>
+        <p:blipFill>
+          <a:blip r:embed="rId3" cstate="print">
+            <a:extLst>
+              <a:ext uri="{28A0092B-C50C-407E-A947-70E740481C1C}">
+                <a14:useLocalDpi xmlns:a14="http://schemas.microsoft.com/office/drawing/2010/main" val="0"/>
+              </a:ext>
+            </a:extLst>
+          </a:blip>
+          <a:srcRect/>
+          <a:stretch>
+            <a:fillRect/>
+          </a:stretch>
+        </p:blipFill>
+        <p:spPr bwMode="auto">
+          <a:xfrm>
+            <a:off x="2697279" y="6956536"/>
+            <a:ext cx="3932121" cy="3471541"/>
+          </a:xfrm>
+          <a:prstGeom prst="rect">
+            <a:avLst/>
+          </a:prstGeom>
+          <a:noFill/>
+          <a:effectLst>
+            <a:glow rad="127000">
+              <a:schemeClr val="accent1">
+                <a:alpha val="0"/>
+              </a:schemeClr>
+            </a:glow>
+          </a:effectLst>
+          <a:extLst>
+            <a:ext uri="{909E8E84-426E-40DD-AFC4-6F175D3DCCD1}">
+              <a14:hiddenFill xmlns:a14="http://schemas.microsoft.com/office/drawing/2010/main">
+                <a:solidFill>
+                  <a:srgbClr val="FFFFFF"/>
+                </a:solidFill>
+              </a14:hiddenFill>
+            </a:ext>
+          </a:extLst>
+        </p:spPr>
+      </p:pic>
+      <p:pic>
+        <p:nvPicPr>
           <p:cNvPr id="5" name="Picture 4" descr="C:\Users\Owner\research\graphene\graphene_hf\results\2009_MagnetoPhonons_121\Ando-Model\l-48_d-10_dn-03_vf-110_w0-15820_d0-55_DLCombi-FWHM.png"/>
           <p:cNvPicPr>
             <a:picLocks noChangeAspect="1" noChangeArrowheads="1"/>
@@ -3104,7 +3193,7 @@
           <p:nvPr/>
         </p:nvPicPr>
         <p:blipFill>
-          <a:blip r:embed="rId2" cstate="print">
+          <a:blip r:embed="rId4" cstate="print">
             <a:extLst>
               <a:ext uri="{28A0092B-C50C-407E-A947-70E740481C1C}">
                 <a14:useLocalDpi xmlns:a14="http://schemas.microsoft.com/office/drawing/2010/main" val="0"/>
@@ -3175,89 +3264,7 @@
       </p:cxnSp>
       <p:pic>
         <p:nvPicPr>
-          <p:cNvPr id="11" name="Picture 5" descr="C:\Users\Owner\research\graphene\graphene_hf\results\2009_MagnetoPhonons_121\Ando-Model\l-42_d-10_dn-03_vf-118_w0-15820_d0-55_DLCombi-FWHM.png"/>
-          <p:cNvPicPr>
-            <a:picLocks noChangeAspect="1" noChangeArrowheads="1"/>
-          </p:cNvPicPr>
-          <p:nvPr/>
-        </p:nvPicPr>
-        <p:blipFill>
-          <a:blip r:embed="rId3" cstate="print">
-            <a:extLst>
-              <a:ext uri="{28A0092B-C50C-407E-A947-70E740481C1C}">
-                <a14:useLocalDpi xmlns:a14="http://schemas.microsoft.com/office/drawing/2010/main" val="0"/>
-              </a:ext>
-            </a:extLst>
-          </a:blip>
-          <a:srcRect/>
-          <a:stretch>
-            <a:fillRect/>
-          </a:stretch>
-        </p:blipFill>
-        <p:spPr bwMode="auto">
-          <a:xfrm>
-            <a:off x="4419599" y="3473513"/>
-            <a:ext cx="4662627" cy="3498787"/>
-          </a:xfrm>
-          <a:prstGeom prst="rect">
-            <a:avLst/>
-          </a:prstGeom>
-          <a:noFill/>
-          <a:extLst>
-            <a:ext uri="{909E8E84-426E-40DD-AFC4-6F175D3DCCD1}">
-              <a14:hiddenFill xmlns:a14="http://schemas.microsoft.com/office/drawing/2010/main">
-                <a:solidFill>
-                  <a:srgbClr val="FFFFFF"/>
-                </a:solidFill>
-              </a14:hiddenFill>
-            </a:ext>
-          </a:extLst>
-        </p:spPr>
-      </p:pic>
-      <p:pic>
-        <p:nvPicPr>
           <p:cNvPr id="12" name="Picture 6" descr="C:\Users\Owner\research\graphene\graphene_hf\results\2009_MagnetoPhonons_121\Ando-Model\l-42_d-10_dn-03_vf-118_w0-15820_d0-55_DLCombi-SHIFT.png"/>
-          <p:cNvPicPr>
-            <a:picLocks noChangeAspect="1" noChangeArrowheads="1"/>
-          </p:cNvPicPr>
-          <p:nvPr/>
-        </p:nvPicPr>
-        <p:blipFill>
-          <a:blip r:embed="rId4" cstate="print">
-            <a:extLst>
-              <a:ext uri="{28A0092B-C50C-407E-A947-70E740481C1C}">
-                <a14:useLocalDpi xmlns:a14="http://schemas.microsoft.com/office/drawing/2010/main" val="0"/>
-              </a:ext>
-            </a:extLst>
-          </a:blip>
-          <a:srcRect/>
-          <a:stretch>
-            <a:fillRect/>
-          </a:stretch>
-        </p:blipFill>
-        <p:spPr bwMode="auto">
-          <a:xfrm>
-            <a:off x="0" y="3393851"/>
-            <a:ext cx="4575338" cy="3426049"/>
-          </a:xfrm>
-          <a:prstGeom prst="rect">
-            <a:avLst/>
-          </a:prstGeom>
-          <a:noFill/>
-          <a:extLst>
-            <a:ext uri="{909E8E84-426E-40DD-AFC4-6F175D3DCCD1}">
-              <a14:hiddenFill xmlns:a14="http://schemas.microsoft.com/office/drawing/2010/main">
-                <a:solidFill>
-                  <a:srgbClr val="FFFFFF"/>
-                </a:solidFill>
-              </a14:hiddenFill>
-            </a:ext>
-          </a:extLst>
-        </p:spPr>
-      </p:pic>
-      <p:pic>
-        <p:nvPicPr>
-          <p:cNvPr id="10" name="Picture 9" descr="C:\Users\Owner\research\graphene\graphene_hf\results\2009_MagnetoPhonons_121\FillingFactor-Dependence\GateVoltageTuning-POSITION-withSymmetricTransitions.png"/>
           <p:cNvPicPr>
             <a:picLocks noChangeAspect="1" noChangeArrowheads="1"/>
           </p:cNvPicPr>
@@ -3278,8 +3285,8 @@
         </p:blipFill>
         <p:spPr bwMode="auto">
           <a:xfrm>
-            <a:off x="2392479" y="6727936"/>
-            <a:ext cx="4160721" cy="3673364"/>
+            <a:off x="0" y="3467100"/>
+            <a:ext cx="4575338" cy="3426049"/>
           </a:xfrm>
           <a:prstGeom prst="rect">
             <a:avLst/>
@@ -3296,8 +3303,8 @@
           </a:extLst>
         </p:spPr>
       </p:pic>
-      <mc:AlternateContent xmlns:mc="http://schemas.openxmlformats.org/markup-compatibility/2006">
-        <mc:Choice xmlns:a14="http://schemas.microsoft.com/office/drawing/2010/main" Requires="a14">
+      <mc:AlternateContent xmlns:mc="http://schemas.openxmlformats.org/markup-compatibility/2006" xmlns:a14="http://schemas.microsoft.com/office/drawing/2010/main">
+        <mc:Choice Requires="a14">
           <p:sp>
             <p:nvSpPr>
               <p:cNvPr id="9" name="TextBox 8"/>
@@ -3366,7 +3373,7 @@
             </p:txBody>
           </p:sp>
         </mc:Choice>
-        <mc:Fallback>
+        <mc:Fallback xmlns="">
           <p:sp>
             <p:nvSpPr>
               <p:cNvPr id="9" name="TextBox 8"/>
@@ -3455,7 +3462,7 @@
         <p:spPr>
           <a:xfrm>
             <a:off x="-32798" y="9005"/>
-            <a:ext cx="2555892" cy="369332"/>
+            <a:ext cx="436338" cy="369332"/>
           </a:xfrm>
           <a:prstGeom prst="rect">
             <a:avLst/>
@@ -3470,35 +3477,7 @@
           <a:p>
             <a:r>
               <a:rPr lang="en-US" dirty="0" smtClean="0"/>
-              <a:t>(a</a:t>
-            </a:r>
-            <a:r>
-              <a:rPr lang="en-US" dirty="0" smtClean="0"/>
-              <a:t>) B=0T, </a:t>
-            </a:r>
-            <a:r>
-              <a:rPr lang="en-US" dirty="0" err="1" smtClean="0"/>
-              <a:t>v</a:t>
-            </a:r>
-            <a:r>
-              <a:rPr lang="en-US" baseline="-25000" dirty="0" err="1" smtClean="0"/>
-              <a:t>F</a:t>
-            </a:r>
-            <a:r>
-              <a:rPr lang="en-US" dirty="0" smtClean="0"/>
-              <a:t>=1.10x10</a:t>
-            </a:r>
-            <a:r>
-              <a:rPr lang="en-US" baseline="30000" dirty="0" smtClean="0"/>
-              <a:t>6</a:t>
-            </a:r>
-            <a:r>
-              <a:rPr lang="en-US" dirty="0" smtClean="0"/>
-              <a:t>ms</a:t>
-            </a:r>
-            <a:r>
-              <a:rPr lang="en-US" baseline="30000" dirty="0" smtClean="0"/>
-              <a:t>-1</a:t>
+              <a:t>(a)</a:t>
             </a:r>
             <a:endParaRPr lang="en-US" dirty="0"/>
           </a:p>
@@ -3541,8 +3520,8 @@
           </a:fontRef>
         </p:style>
       </p:cxnSp>
-      <mc:AlternateContent xmlns:mc="http://schemas.openxmlformats.org/markup-compatibility/2006">
-        <mc:Choice xmlns:a14="http://schemas.microsoft.com/office/drawing/2010/main" Requires="a14">
+      <mc:AlternateContent xmlns:mc="http://schemas.openxmlformats.org/markup-compatibility/2006" xmlns:a14="http://schemas.microsoft.com/office/drawing/2010/main">
+        <mc:Choice Requires="a14">
           <p:sp>
             <p:nvSpPr>
               <p:cNvPr id="7" name="TextBox 6"/>
@@ -3611,7 +3590,7 @@
             </p:txBody>
           </p:sp>
         </mc:Choice>
-        <mc:Fallback>
+        <mc:Fallback xmlns="">
           <p:sp>
             <p:nvSpPr>
               <p:cNvPr id="7" name="TextBox 6"/>
@@ -3659,7 +3638,7 @@
         <p:spPr>
           <a:xfrm>
             <a:off x="-77425" y="3298656"/>
-            <a:ext cx="2567113" cy="369332"/>
+            <a:ext cx="447558" cy="369332"/>
           </a:xfrm>
           <a:prstGeom prst="rect">
             <a:avLst/>
@@ -3674,35 +3653,7 @@
           <a:p>
             <a:r>
               <a:rPr lang="en-US" dirty="0" smtClean="0"/>
-              <a:t>(b</a:t>
-            </a:r>
-            <a:r>
-              <a:rPr lang="en-US" dirty="0" smtClean="0"/>
-              <a:t>) B=0T, </a:t>
-            </a:r>
-            <a:r>
-              <a:rPr lang="en-US" dirty="0" err="1" smtClean="0"/>
-              <a:t>v</a:t>
-            </a:r>
-            <a:r>
-              <a:rPr lang="en-US" baseline="-25000" dirty="0" err="1" smtClean="0"/>
-              <a:t>F</a:t>
-            </a:r>
-            <a:r>
-              <a:rPr lang="en-US" dirty="0" smtClean="0"/>
-              <a:t>=1.18x10</a:t>
-            </a:r>
-            <a:r>
-              <a:rPr lang="en-US" baseline="30000" dirty="0" smtClean="0"/>
-              <a:t>6</a:t>
-            </a:r>
-            <a:r>
-              <a:rPr lang="en-US" dirty="0" smtClean="0"/>
-              <a:t>ms</a:t>
-            </a:r>
-            <a:r>
-              <a:rPr lang="en-US" baseline="30000" dirty="0" smtClean="0"/>
-              <a:t>-1</a:t>
+              <a:t>(b)</a:t>
             </a:r>
             <a:endParaRPr lang="en-US" dirty="0"/>
           </a:p>
@@ -3717,7 +3668,7 @@
         <p:spPr>
           <a:xfrm>
             <a:off x="0" y="6845647"/>
-            <a:ext cx="2834815" cy="646331"/>
+            <a:ext cx="423514" cy="646331"/>
           </a:xfrm>
           <a:prstGeom prst="rect">
             <a:avLst/>
@@ -3732,43 +3683,485 @@
           <a:p>
             <a:r>
               <a:rPr lang="en-US" dirty="0" smtClean="0"/>
-              <a:t>(c</a:t>
-            </a:r>
-            <a:r>
-              <a:rPr lang="en-US" dirty="0" smtClean="0"/>
-              <a:t>) B=12.6T, </a:t>
-            </a:r>
-            <a:r>
-              <a:rPr lang="en-US" dirty="0" err="1" smtClean="0"/>
+              <a:t>(c)</a:t>
+            </a:r>
+          </a:p>
+          <a:p>
+            <a:endParaRPr lang="en-US" dirty="0"/>
+          </a:p>
+        </p:txBody>
+      </p:sp>
+      <p:sp>
+        <p:nvSpPr>
+          <p:cNvPr id="2" name="Rectangle 1"/>
+          <p:cNvSpPr/>
+          <p:nvPr/>
+        </p:nvSpPr>
+        <p:spPr>
+          <a:xfrm>
+            <a:off x="3517458" y="-11315"/>
+            <a:ext cx="3738780" cy="400110"/>
+          </a:xfrm>
+          <a:prstGeom prst="rect">
+            <a:avLst/>
+          </a:prstGeom>
+        </p:spPr>
+        <p:txBody>
+          <a:bodyPr wrap="none">
+            <a:spAutoFit/>
+          </a:bodyPr>
+          <a:lstStyle/>
+          <a:p>
+            <a:r>
+              <a:rPr lang="en-US" sz="2000" b="1" dirty="0"/>
+              <a:t>B=0T, </a:t>
+            </a:r>
+            <a:r>
+              <a:rPr lang="en-US" sz="2000" b="1" dirty="0" err="1" smtClean="0"/>
               <a:t>v</a:t>
             </a:r>
             <a:r>
-              <a:rPr lang="en-US" baseline="-25000" dirty="0" err="1" smtClean="0"/>
+              <a:rPr lang="en-US" sz="2000" b="1" baseline="-25000" dirty="0" err="1" smtClean="0"/>
               <a:t>F</a:t>
             </a:r>
             <a:r>
-              <a:rPr lang="en-US" dirty="0" smtClean="0"/>
+              <a:rPr lang="en-US" sz="2000" b="1" dirty="0" smtClean="0"/>
+              <a:t>=1.10x10</a:t>
+            </a:r>
+            <a:r>
+              <a:rPr lang="en-US" sz="2000" b="1" baseline="30000" dirty="0" smtClean="0"/>
+              <a:t>6</a:t>
+            </a:r>
+            <a:r>
+              <a:rPr lang="en-US" sz="2000" b="1" dirty="0" smtClean="0"/>
+              <a:t>ms</a:t>
+            </a:r>
+            <a:r>
+              <a:rPr lang="en-US" sz="2000" b="1" baseline="30000" dirty="0" smtClean="0"/>
+              <a:t>-1</a:t>
+            </a:r>
+            <a:r>
+              <a:rPr lang="en-US" sz="2000" b="1" dirty="0" smtClean="0"/>
+              <a:t>, </a:t>
+            </a:r>
+            <a:r>
+              <a:rPr lang="el-GR" sz="2000" b="1" dirty="0" smtClean="0"/>
+              <a:t>λ</a:t>
+            </a:r>
+            <a:r>
+              <a:rPr lang="en-US" sz="2000" b="1" dirty="0" smtClean="0"/>
+              <a:t>=4.8x10</a:t>
+            </a:r>
+            <a:r>
+              <a:rPr lang="en-US" sz="2000" b="1" baseline="30000" dirty="0" smtClean="0"/>
+              <a:t>-3</a:t>
+            </a:r>
+            <a:endParaRPr lang="en-US" sz="2000" b="1" dirty="0"/>
+          </a:p>
+        </p:txBody>
+      </p:sp>
+      <p:sp>
+        <p:nvSpPr>
+          <p:cNvPr id="3" name="Rectangle 2"/>
+          <p:cNvSpPr/>
+          <p:nvPr/>
+        </p:nvSpPr>
+        <p:spPr>
+          <a:xfrm>
+            <a:off x="3012132" y="3390900"/>
+            <a:ext cx="3738780" cy="707886"/>
+          </a:xfrm>
+          <a:prstGeom prst="rect">
+            <a:avLst/>
+          </a:prstGeom>
+        </p:spPr>
+        <p:txBody>
+          <a:bodyPr wrap="none">
+            <a:spAutoFit/>
+          </a:bodyPr>
+          <a:lstStyle/>
+          <a:p>
+            <a:r>
+              <a:rPr lang="en-US" sz="2000" b="1" dirty="0"/>
+              <a:t>B=0T, </a:t>
+            </a:r>
+            <a:r>
+              <a:rPr lang="en-US" sz="2000" b="1" dirty="0" err="1" smtClean="0"/>
+              <a:t>v</a:t>
+            </a:r>
+            <a:r>
+              <a:rPr lang="en-US" sz="2000" b="1" baseline="-25000" dirty="0" err="1" smtClean="0"/>
+              <a:t>F</a:t>
+            </a:r>
+            <a:r>
+              <a:rPr lang="en-US" sz="2000" b="1" dirty="0" smtClean="0"/>
               <a:t>=1.18x10</a:t>
             </a:r>
             <a:r>
-              <a:rPr lang="en-US" baseline="30000" dirty="0" smtClean="0"/>
+              <a:rPr lang="en-US" sz="2000" b="1" baseline="30000" dirty="0" smtClean="0"/>
               <a:t>6</a:t>
             </a:r>
             <a:r>
-              <a:rPr lang="en-US" dirty="0" smtClean="0"/>
+              <a:rPr lang="en-US" sz="2000" b="1" dirty="0" smtClean="0"/>
               <a:t>ms</a:t>
             </a:r>
             <a:r>
-              <a:rPr lang="en-US" baseline="30000" dirty="0" smtClean="0"/>
+              <a:rPr lang="en-US" sz="2000" b="1" baseline="30000" dirty="0" smtClean="0"/>
               <a:t>-1</a:t>
             </a:r>
-            <a:endParaRPr lang="en-US" dirty="0" smtClean="0"/>
-          </a:p>
-          <a:p>
-            <a:endParaRPr lang="en-US" dirty="0"/>
-          </a:p>
-        </p:txBody>
-      </p:sp>
+            <a:r>
+              <a:rPr lang="en-US" sz="2000" b="1" dirty="0" smtClean="0"/>
+              <a:t>, </a:t>
+            </a:r>
+            <a:r>
+              <a:rPr lang="el-GR" sz="2000" b="1" dirty="0"/>
+              <a:t>λ</a:t>
+            </a:r>
+            <a:r>
+              <a:rPr lang="en-US" sz="2000" b="1" dirty="0"/>
+              <a:t>=4.8x10</a:t>
+            </a:r>
+            <a:r>
+              <a:rPr lang="en-US" sz="2000" b="1" baseline="30000" dirty="0"/>
+              <a:t>-3</a:t>
+            </a:r>
+            <a:endParaRPr lang="en-US" sz="2000" b="1" dirty="0"/>
+          </a:p>
+          <a:p>
+            <a:endParaRPr lang="en-US" sz="2000" b="1" dirty="0"/>
+          </a:p>
+        </p:txBody>
+      </p:sp>
+      <p:cxnSp>
+        <p:nvCxnSpPr>
+          <p:cNvPr id="16" name="Straight Arrow Connector 15"/>
+          <p:cNvCxnSpPr/>
+          <p:nvPr/>
+        </p:nvCxnSpPr>
+        <p:spPr>
+          <a:xfrm flipV="1">
+            <a:off x="8153400" y="952500"/>
+            <a:ext cx="0" cy="1831777"/>
+          </a:xfrm>
+          <a:prstGeom prst="straightConnector1">
+            <a:avLst/>
+          </a:prstGeom>
+          <a:ln w="28575">
+            <a:solidFill>
+              <a:schemeClr val="tx1"/>
+            </a:solidFill>
+            <a:headEnd type="arrow" w="med" len="med"/>
+            <a:tailEnd type="arrow" w="med" len="med"/>
+          </a:ln>
+        </p:spPr>
+        <p:style>
+          <a:lnRef idx="1">
+            <a:schemeClr val="accent1"/>
+          </a:lnRef>
+          <a:fillRef idx="0">
+            <a:schemeClr val="accent1"/>
+          </a:fillRef>
+          <a:effectRef idx="0">
+            <a:schemeClr val="accent1"/>
+          </a:effectRef>
+          <a:fontRef idx="minor">
+            <a:schemeClr val="tx1"/>
+          </a:fontRef>
+        </p:style>
+      </p:cxnSp>
+      <mc:AlternateContent xmlns:mc="http://schemas.openxmlformats.org/markup-compatibility/2006" xmlns:a14="http://schemas.microsoft.com/office/drawing/2010/main">
+        <mc:Choice Requires="a14">
+          <p:sp>
+            <p:nvSpPr>
+              <p:cNvPr id="19" name="TextBox 18"/>
+              <p:cNvSpPr txBox="1"/>
+              <p:nvPr/>
+            </p:nvSpPr>
+            <p:spPr>
+              <a:xfrm>
+                <a:off x="8128250" y="1714500"/>
+                <a:ext cx="497316" cy="307777"/>
+              </a:xfrm>
+              <a:prstGeom prst="rect">
+                <a:avLst/>
+              </a:prstGeom>
+              <a:noFill/>
+            </p:spPr>
+            <p:txBody>
+              <a:bodyPr wrap="none" rtlCol="0">
+                <a:spAutoFit/>
+              </a:bodyPr>
+              <a:lstStyle/>
+              <a:p>
+                <a:pPr/>
+                <a14:m>
+                  <m:oMathPara xmlns:m="http://schemas.openxmlformats.org/officeDocument/2006/math">
+                    <m:oMathParaPr>
+                      <m:jc m:val="centerGroup"/>
+                    </m:oMathParaPr>
+                    <m:oMath xmlns:m="http://schemas.openxmlformats.org/officeDocument/2006/math">
+                      <m:r>
+                        <a:rPr lang="en-US" sz="1400" i="1" smtClean="0">
+                          <a:latin typeface="Cambria Math"/>
+                          <a:ea typeface="Cambria Math"/>
+                        </a:rPr>
+                        <m:t>∝</m:t>
+                      </m:r>
+                      <m:r>
+                        <a:rPr lang="en-US" sz="1400" b="0" i="1" smtClean="0">
+                          <a:latin typeface="Cambria Math"/>
+                          <a:ea typeface="Cambria Math"/>
+                        </a:rPr>
+                        <m:t>𝜆</m:t>
+                      </m:r>
+                    </m:oMath>
+                  </m:oMathPara>
+                </a14:m>
+                <a:endParaRPr lang="en-US" sz="1400" dirty="0"/>
+              </a:p>
+            </p:txBody>
+          </p:sp>
+        </mc:Choice>
+        <mc:Fallback xmlns="">
+          <p:sp>
+            <p:nvSpPr>
+              <p:cNvPr id="19" name="TextBox 18"/>
+              <p:cNvSpPr txBox="1">
+                <a:spLocks noRot="1" noChangeAspect="1" noMove="1" noResize="1" noEditPoints="1" noAdjustHandles="1" noChangeArrowheads="1" noChangeShapeType="1" noTextEdit="1"/>
+              </p:cNvSpPr>
+              <p:nvPr/>
+            </p:nvSpPr>
+            <p:spPr>
+              <a:xfrm>
+                <a:off x="8128250" y="1714500"/>
+                <a:ext cx="497316" cy="307777"/>
+              </a:xfrm>
+              <a:prstGeom prst="rect">
+                <a:avLst/>
+              </a:prstGeom>
+              <a:blipFill rotWithShape="1">
+                <a:blip r:embed="rId9"/>
+                <a:stretch>
+                  <a:fillRect/>
+                </a:stretch>
+              </a:blipFill>
+            </p:spPr>
+            <p:txBody>
+              <a:bodyPr/>
+              <a:lstStyle/>
+              <a:p>
+                <a:r>
+                  <a:rPr lang="en-US">
+                    <a:noFill/>
+                  </a:rPr>
+                  <a:t> </a:t>
+                </a:r>
+              </a:p>
+            </p:txBody>
+          </p:sp>
+        </mc:Fallback>
+      </mc:AlternateContent>
+      <p:sp>
+        <p:nvSpPr>
+          <p:cNvPr id="21" name="Rectangle 20"/>
+          <p:cNvSpPr/>
+          <p:nvPr/>
+        </p:nvSpPr>
+        <p:spPr>
+          <a:xfrm>
+            <a:off x="2965625" y="6797814"/>
+            <a:ext cx="4197175" cy="707886"/>
+          </a:xfrm>
+          <a:prstGeom prst="rect">
+            <a:avLst/>
+          </a:prstGeom>
+        </p:spPr>
+        <p:txBody>
+          <a:bodyPr wrap="none">
+            <a:spAutoFit/>
+          </a:bodyPr>
+          <a:lstStyle/>
+          <a:p>
+            <a:r>
+              <a:rPr lang="en-US" sz="2000" b="1" dirty="0" smtClean="0"/>
+              <a:t>B=12.6T, </a:t>
+            </a:r>
+            <a:r>
+              <a:rPr lang="en-US" sz="2000" b="1" dirty="0" err="1" smtClean="0"/>
+              <a:t>v</a:t>
+            </a:r>
+            <a:r>
+              <a:rPr lang="en-US" sz="2000" b="1" baseline="-25000" dirty="0" err="1" smtClean="0"/>
+              <a:t>F</a:t>
+            </a:r>
+            <a:r>
+              <a:rPr lang="en-US" sz="2000" b="1" dirty="0" smtClean="0"/>
+              <a:t>=1.18x10</a:t>
+            </a:r>
+            <a:r>
+              <a:rPr lang="en-US" sz="2000" b="1" baseline="30000" dirty="0" smtClean="0"/>
+              <a:t>6</a:t>
+            </a:r>
+            <a:r>
+              <a:rPr lang="en-US" sz="2000" b="1" dirty="0" smtClean="0"/>
+              <a:t>ms</a:t>
+            </a:r>
+            <a:r>
+              <a:rPr lang="en-US" sz="2000" b="1" baseline="30000" dirty="0" smtClean="0"/>
+              <a:t>-1</a:t>
+            </a:r>
+            <a:r>
+              <a:rPr lang="en-US" sz="2000" b="1" dirty="0" smtClean="0"/>
+              <a:t>, </a:t>
+            </a:r>
+            <a:r>
+              <a:rPr lang="el-GR" sz="2000" b="1" dirty="0"/>
+              <a:t>λ</a:t>
+            </a:r>
+            <a:r>
+              <a:rPr lang="en-US" sz="2000" b="1" dirty="0"/>
+              <a:t>=4.8x10</a:t>
+            </a:r>
+            <a:r>
+              <a:rPr lang="en-US" sz="2000" b="1" baseline="30000" dirty="0"/>
+              <a:t>-3</a:t>
+            </a:r>
+            <a:endParaRPr lang="en-US" sz="2000" b="1" dirty="0"/>
+          </a:p>
+          <a:p>
+            <a:endParaRPr lang="en-US" sz="2000" b="1" dirty="0"/>
+          </a:p>
+        </p:txBody>
+      </p:sp>
+      <p:cxnSp>
+        <p:nvCxnSpPr>
+          <p:cNvPr id="20" name="Straight Arrow Connector 19"/>
+          <p:cNvCxnSpPr/>
+          <p:nvPr/>
+        </p:nvCxnSpPr>
+        <p:spPr>
+          <a:xfrm flipV="1">
+            <a:off x="8138434" y="4226123"/>
+            <a:ext cx="0" cy="1831777"/>
+          </a:xfrm>
+          <a:prstGeom prst="straightConnector1">
+            <a:avLst/>
+          </a:prstGeom>
+          <a:ln w="28575">
+            <a:solidFill>
+              <a:schemeClr val="tx1"/>
+            </a:solidFill>
+            <a:headEnd type="arrow" w="med" len="med"/>
+            <a:tailEnd type="arrow" w="med" len="med"/>
+          </a:ln>
+        </p:spPr>
+        <p:style>
+          <a:lnRef idx="1">
+            <a:schemeClr val="accent1"/>
+          </a:lnRef>
+          <a:fillRef idx="0">
+            <a:schemeClr val="accent1"/>
+          </a:fillRef>
+          <a:effectRef idx="0">
+            <a:schemeClr val="accent1"/>
+          </a:effectRef>
+          <a:fontRef idx="minor">
+            <a:schemeClr val="tx1"/>
+          </a:fontRef>
+        </p:style>
+      </p:cxnSp>
+      <mc:AlternateContent xmlns:mc="http://schemas.openxmlformats.org/markup-compatibility/2006">
+        <mc:Choice xmlns:a14="http://schemas.microsoft.com/office/drawing/2010/main" Requires="a14">
+          <p:sp>
+            <p:nvSpPr>
+              <p:cNvPr id="22" name="TextBox 21"/>
+              <p:cNvSpPr txBox="1"/>
+              <p:nvPr/>
+            </p:nvSpPr>
+            <p:spPr>
+              <a:xfrm>
+                <a:off x="8113284" y="4988123"/>
+                <a:ext cx="497316" cy="307777"/>
+              </a:xfrm>
+              <a:prstGeom prst="rect">
+                <a:avLst/>
+              </a:prstGeom>
+              <a:noFill/>
+            </p:spPr>
+            <p:txBody>
+              <a:bodyPr wrap="none" rtlCol="0">
+                <a:spAutoFit/>
+              </a:bodyPr>
+              <a:lstStyle/>
+              <a:p>
+                <a:pPr/>
+                <a14:m>
+                  <m:oMathPara xmlns:m="http://schemas.openxmlformats.org/officeDocument/2006/math">
+                    <m:oMathParaPr>
+                      <m:jc m:val="centerGroup"/>
+                    </m:oMathParaPr>
+                    <m:oMath xmlns:m="http://schemas.openxmlformats.org/officeDocument/2006/math">
+                      <m:r>
+                        <a:rPr lang="en-US" sz="1400" i="1" smtClean="0">
+                          <a:latin typeface="Cambria Math"/>
+                          <a:ea typeface="Cambria Math"/>
+                        </a:rPr>
+                        <m:t>∝</m:t>
+                      </m:r>
+                      <m:r>
+                        <a:rPr lang="en-US" sz="1400" b="0" i="1" smtClean="0">
+                          <a:latin typeface="Cambria Math"/>
+                          <a:ea typeface="Cambria Math"/>
+                        </a:rPr>
+                        <m:t>𝜆</m:t>
+                      </m:r>
+                    </m:oMath>
+                  </m:oMathPara>
+                </a14:m>
+                <a:endParaRPr lang="en-US" sz="1400" dirty="0"/>
+              </a:p>
+            </p:txBody>
+          </p:sp>
+        </mc:Choice>
+        <mc:Fallback>
+          <p:sp>
+            <p:nvSpPr>
+              <p:cNvPr id="22" name="TextBox 21"/>
+              <p:cNvSpPr txBox="1">
+                <a:spLocks noRot="1" noChangeAspect="1" noMove="1" noResize="1" noEditPoints="1" noAdjustHandles="1" noChangeArrowheads="1" noChangeShapeType="1" noTextEdit="1"/>
+              </p:cNvSpPr>
+              <p:nvPr/>
+            </p:nvSpPr>
+            <p:spPr>
+              <a:xfrm>
+                <a:off x="8113284" y="4988123"/>
+                <a:ext cx="497316" cy="307777"/>
+              </a:xfrm>
+              <a:prstGeom prst="rect">
+                <a:avLst/>
+              </a:prstGeom>
+              <a:blipFill rotWithShape="1">
+                <a:blip r:embed="rId10"/>
+                <a:stretch>
+                  <a:fillRect/>
+                </a:stretch>
+              </a:blipFill>
+            </p:spPr>
+            <p:txBody>
+              <a:bodyPr/>
+              <a:lstStyle/>
+              <a:p>
+                <a:r>
+                  <a:rPr lang="en-US">
+                    <a:noFill/>
+                  </a:rPr>
+                  <a:t> </a:t>
+                </a:r>
+              </a:p>
+            </p:txBody>
+          </p:sp>
+        </mc:Fallback>
+      </mc:AlternateContent>
     </p:spTree>
     <p:extLst>
       <p:ext uri="{BB962C8B-B14F-4D97-AF65-F5344CB8AC3E}">
@@ -3779,6 +4172,13 @@
   <p:clrMapOvr>
     <a:masterClrMapping/>
   </p:clrMapOvr>
+  <p:timing>
+    <p:tnLst>
+      <p:par>
+        <p:cTn id="1" dur="indefinite" restart="never" nodeType="tmRoot"/>
+      </p:par>
+    </p:tnLst>
+  </p:timing>
 </p:sld>
 </file>
 

</xml_diff>